<commit_message>
adjusted pbix and pptx
</commit_message>
<xml_diff>
--- a/resources/Telco Customer Churn Analysis.pptx
+++ b/resources/Telco Customer Churn Analysis.pptx
@@ -13,8 +13,8 @@
     <p:sldId id="258" r:id="rId4"/>
     <p:sldId id="259" r:id="rId5"/>
     <p:sldId id="260" r:id="rId6"/>
-    <p:sldId id="261" r:id="rId7"/>
-    <p:sldId id="262" r:id="rId8"/>
+    <p:sldId id="262" r:id="rId7"/>
+    <p:sldId id="261" r:id="rId8"/>
     <p:sldId id="265" r:id="rId9"/>
     <p:sldId id="264" r:id="rId10"/>
   </p:sldIdLst>
@@ -126,7 +126,7 @@
 <file path=ppt/revisionInfo.xml><?xml version="1.0" encoding="utf-8"?>
 <p1510:revInfo xmlns:a="http://schemas.openxmlformats.org/drawingml/2006/main" xmlns:r="http://schemas.openxmlformats.org/officeDocument/2006/relationships" xmlns:p1510="http://schemas.microsoft.com/office/powerpoint/2015/10/main">
   <p1510:revLst>
-    <p1510:client id="{AD0F9ED8-6AE1-4642-8A36-835899EB4368}" v="17" dt="2025-04-10T14:11:26.456"/>
+    <p1510:client id="{AD0F9ED8-6AE1-4642-8A36-835899EB4368}" v="23" dt="2025-04-10T15:00:41.432"/>
   </p1510:revLst>
 </p1510:revInfo>
 </file>
@@ -135,13 +135,13 @@
 <pc:chgInfo xmlns:a="http://schemas.openxmlformats.org/drawingml/2006/main" xmlns:r="http://schemas.openxmlformats.org/officeDocument/2006/relationships" xmlns:ac="http://schemas.microsoft.com/office/drawing/2013/main/command" xmlns:pc="http://schemas.microsoft.com/office/powerpoint/2013/main/command">
   <pc:docChgLst>
     <pc:chgData name="KwangSuk Sul" userId="c191b7df44b9fe19" providerId="LiveId" clId="{AD0F9ED8-6AE1-4642-8A36-835899EB4368}"/>
-    <pc:docChg chg="undo custSel addSld delSld modSld">
-      <pc:chgData name="KwangSuk Sul" userId="c191b7df44b9fe19" providerId="LiveId" clId="{AD0F9ED8-6AE1-4642-8A36-835899EB4368}" dt="2025-04-10T14:11:26.456" v="2458" actId="207"/>
+    <pc:docChg chg="undo custSel addSld delSld modSld sldOrd">
+      <pc:chgData name="KwangSuk Sul" userId="c191b7df44b9fe19" providerId="LiveId" clId="{AD0F9ED8-6AE1-4642-8A36-835899EB4368}" dt="2025-04-10T15:00:41.432" v="2510"/>
       <pc:docMkLst>
         <pc:docMk/>
       </pc:docMkLst>
-      <pc:sldChg chg="modSp">
-        <pc:chgData name="KwangSuk Sul" userId="c191b7df44b9fe19" providerId="LiveId" clId="{AD0F9ED8-6AE1-4642-8A36-835899EB4368}" dt="2025-04-10T14:11:26.456" v="2458" actId="207"/>
+      <pc:sldChg chg="modSp modAnim">
+        <pc:chgData name="KwangSuk Sul" userId="c191b7df44b9fe19" providerId="LiveId" clId="{AD0F9ED8-6AE1-4642-8A36-835899EB4368}" dt="2025-04-10T15:00:41.432" v="2510"/>
         <pc:sldMkLst>
           <pc:docMk/>
           <pc:sldMk cId="2769841588" sldId="256"/>
@@ -369,7 +369,7 @@
         </pc:picChg>
       </pc:sldChg>
       <pc:sldChg chg="addSp delSp modSp add mod setBg modNotesTx">
-        <pc:chgData name="KwangSuk Sul" userId="c191b7df44b9fe19" providerId="LiveId" clId="{AD0F9ED8-6AE1-4642-8A36-835899EB4368}" dt="2025-04-10T14:10:32.153" v="2449" actId="207"/>
+        <pc:chgData name="KwangSuk Sul" userId="c191b7df44b9fe19" providerId="LiveId" clId="{AD0F9ED8-6AE1-4642-8A36-835899EB4368}" dt="2025-04-10T14:53:54.328" v="2506" actId="1076"/>
         <pc:sldMkLst>
           <pc:docMk/>
           <pc:sldMk cId="2516845808" sldId="260"/>
@@ -422,12 +422,20 @@
             <ac:spMk id="18" creationId="{FE43805F-24A6-46A4-B19B-54F28347355C}"/>
           </ac:spMkLst>
         </pc:spChg>
-        <pc:picChg chg="add mod">
-          <ac:chgData name="KwangSuk Sul" userId="c191b7df44b9fe19" providerId="LiveId" clId="{AD0F9ED8-6AE1-4642-8A36-835899EB4368}" dt="2025-04-09T19:38:07.321" v="408" actId="14100"/>
+        <pc:picChg chg="add del mod">
+          <ac:chgData name="KwangSuk Sul" userId="c191b7df44b9fe19" providerId="LiveId" clId="{AD0F9ED8-6AE1-4642-8A36-835899EB4368}" dt="2025-04-10T14:47:04.520" v="2490" actId="478"/>
           <ac:picMkLst>
             <pc:docMk/>
             <pc:sldMk cId="2516845808" sldId="260"/>
             <ac:picMk id="4" creationId="{A803A564-31F3-879E-E0F3-1805A3F45755}"/>
+          </ac:picMkLst>
+        </pc:picChg>
+        <pc:picChg chg="add del mod">
+          <ac:chgData name="KwangSuk Sul" userId="c191b7df44b9fe19" providerId="LiveId" clId="{AD0F9ED8-6AE1-4642-8A36-835899EB4368}" dt="2025-04-10T14:47:29.015" v="2495" actId="478"/>
+          <ac:picMkLst>
+            <pc:docMk/>
+            <pc:sldMk cId="2516845808" sldId="260"/>
+            <ac:picMk id="5" creationId="{AC6438AD-A57B-7212-5936-9AAB0FC788C9}"/>
           </ac:picMkLst>
         </pc:picChg>
         <pc:picChg chg="del">
@@ -436,6 +444,30 @@
             <pc:docMk/>
             <pc:sldMk cId="2516845808" sldId="260"/>
             <ac:picMk id="8" creationId="{DEF62FAB-CFD0-50E1-C20B-0BE94110160E}"/>
+          </ac:picMkLst>
+        </pc:picChg>
+        <pc:picChg chg="add del mod">
+          <ac:chgData name="KwangSuk Sul" userId="c191b7df44b9fe19" providerId="LiveId" clId="{AD0F9ED8-6AE1-4642-8A36-835899EB4368}" dt="2025-04-10T14:48:48.732" v="2499" actId="478"/>
+          <ac:picMkLst>
+            <pc:docMk/>
+            <pc:sldMk cId="2516845808" sldId="260"/>
+            <ac:picMk id="8" creationId="{E5F5B1DB-0B34-E8D5-3FE7-7A55EB301303}"/>
+          </ac:picMkLst>
+        </pc:picChg>
+        <pc:picChg chg="add del mod">
+          <ac:chgData name="KwangSuk Sul" userId="c191b7df44b9fe19" providerId="LiveId" clId="{AD0F9ED8-6AE1-4642-8A36-835899EB4368}" dt="2025-04-10T14:53:44.367" v="2502" actId="478"/>
+          <ac:picMkLst>
+            <pc:docMk/>
+            <pc:sldMk cId="2516845808" sldId="260"/>
+            <ac:picMk id="10" creationId="{B073FF48-3688-EDB5-0239-488C701FE99F}"/>
+          </ac:picMkLst>
+        </pc:picChg>
+        <pc:picChg chg="add mod">
+          <ac:chgData name="KwangSuk Sul" userId="c191b7df44b9fe19" providerId="LiveId" clId="{AD0F9ED8-6AE1-4642-8A36-835899EB4368}" dt="2025-04-10T14:53:54.328" v="2506" actId="1076"/>
+          <ac:picMkLst>
+            <pc:docMk/>
+            <pc:sldMk cId="2516845808" sldId="260"/>
+            <ac:picMk id="13" creationId="{104983D1-1B2A-8194-6CE7-8E22A2071D55}"/>
           </ac:picMkLst>
         </pc:picChg>
       </pc:sldChg>
@@ -510,8 +542,8 @@
           </ac:picMkLst>
         </pc:picChg>
       </pc:sldChg>
-      <pc:sldChg chg="addSp delSp modSp new mod setBg">
-        <pc:chgData name="KwangSuk Sul" userId="c191b7df44b9fe19" providerId="LiveId" clId="{AD0F9ED8-6AE1-4642-8A36-835899EB4368}" dt="2025-04-09T20:08:18.394" v="684" actId="1076"/>
+      <pc:sldChg chg="addSp delSp modSp new mod ord setBg">
+        <pc:chgData name="KwangSuk Sul" userId="c191b7df44b9fe19" providerId="LiveId" clId="{AD0F9ED8-6AE1-4642-8A36-835899EB4368}" dt="2025-04-10T14:45:06.110" v="2460"/>
         <pc:sldMkLst>
           <pc:docMk/>
           <pc:sldMk cId="427276087" sldId="262"/>
@@ -1803,6 +1835,14 @@
           <a:bodyPr/>
           <a:lstStyle/>
           <a:p>
+            <a:r>
+              <a:rPr lang="en-GB" dirty="0"/>
+              <a:t>Tenure = </a:t>
+            </a:r>
+            <a:r>
+              <a:rPr lang="ko-KR" altLang="en-US" dirty="0"/>
+              <a:t>고객 유지기간</a:t>
+            </a:r>
             <a:endParaRPr lang="en-GB" dirty="0"/>
           </a:p>
         </p:txBody>
@@ -5300,273 +5340,6 @@
   <p:clrMapOvr>
     <a:masterClrMapping/>
   </p:clrMapOvr>
-  <p:timing>
-    <p:tnLst>
-      <p:par>
-        <p:cTn id="1" dur="indefinite" restart="never" nodeType="tmRoot">
-          <p:childTnLst>
-            <p:seq concurrent="1" nextAc="seek">
-              <p:cTn id="2" dur="indefinite" nodeType="mainSeq">
-                <p:childTnLst>
-                  <p:par>
-                    <p:cTn id="3" fill="hold">
-                      <p:stCondLst>
-                        <p:cond delay="indefinite"/>
-                        <p:cond evt="onBegin" delay="0">
-                          <p:tn val="2"/>
-                        </p:cond>
-                      </p:stCondLst>
-                      <p:childTnLst>
-                        <p:par>
-                          <p:cTn id="4" fill="hold">
-                            <p:stCondLst>
-                              <p:cond delay="0"/>
-                            </p:stCondLst>
-                            <p:childTnLst>
-                              <p:par>
-                                <p:cTn id="5" presetID="10" presetClass="entr" presetSubtype="0" fill="hold" grpId="0" nodeType="withEffect">
-                                  <p:stCondLst>
-                                    <p:cond delay="1000"/>
-                                  </p:stCondLst>
-                                  <p:iterate>
-                                    <p:tmPct val="10000"/>
-                                  </p:iterate>
-                                  <p:childTnLst>
-                                    <p:set>
-                                      <p:cBhvr>
-                                        <p:cTn id="6" dur="1" fill="hold">
-                                          <p:stCondLst>
-                                            <p:cond delay="0"/>
-                                          </p:stCondLst>
-                                        </p:cTn>
-                                        <p:tgtEl>
-                                          <p:spTgt spid="2"/>
-                                        </p:tgtEl>
-                                        <p:attrNameLst>
-                                          <p:attrName>style.visibility</p:attrName>
-                                        </p:attrNameLst>
-                                      </p:cBhvr>
-                                      <p:to>
-                                        <p:strVal val="visible"/>
-                                      </p:to>
-                                    </p:set>
-                                    <p:animEffect transition="in" filter="fade">
-                                      <p:cBhvr>
-                                        <p:cTn id="7" dur="700"/>
-                                        <p:tgtEl>
-                                          <p:spTgt spid="2"/>
-                                        </p:tgtEl>
-                                      </p:cBhvr>
-                                    </p:animEffect>
-                                  </p:childTnLst>
-                                </p:cTn>
-                              </p:par>
-                              <p:par>
-                                <p:cTn id="8" presetID="10" presetClass="entr" presetSubtype="0" fill="hold" grpId="0" nodeType="withEffect">
-                                  <p:stCondLst>
-                                    <p:cond delay="1500"/>
-                                  </p:stCondLst>
-                                  <p:iterate>
-                                    <p:tmPct val="10000"/>
-                                  </p:iterate>
-                                  <p:childTnLst>
-                                    <p:set>
-                                      <p:cBhvr>
-                                        <p:cTn id="9" dur="1" fill="hold">
-                                          <p:stCondLst>
-                                            <p:cond delay="0"/>
-                                          </p:stCondLst>
-                                        </p:cTn>
-                                        <p:tgtEl>
-                                          <p:spTgt spid="3">
-                                            <p:txEl>
-                                              <p:pRg st="0" end="0"/>
-                                            </p:txEl>
-                                          </p:spTgt>
-                                        </p:tgtEl>
-                                        <p:attrNameLst>
-                                          <p:attrName>style.visibility</p:attrName>
-                                        </p:attrNameLst>
-                                      </p:cBhvr>
-                                      <p:to>
-                                        <p:strVal val="visible"/>
-                                      </p:to>
-                                    </p:set>
-                                    <p:animEffect transition="in" filter="fade">
-                                      <p:cBhvr>
-                                        <p:cTn id="10" dur="700"/>
-                                        <p:tgtEl>
-                                          <p:spTgt spid="3">
-                                            <p:txEl>
-                                              <p:pRg st="0" end="0"/>
-                                            </p:txEl>
-                                          </p:spTgt>
-                                        </p:tgtEl>
-                                      </p:cBhvr>
-                                    </p:animEffect>
-                                  </p:childTnLst>
-                                </p:cTn>
-                              </p:par>
-                            </p:childTnLst>
-                          </p:cTn>
-                        </p:par>
-                      </p:childTnLst>
-                    </p:cTn>
-                  </p:par>
-                  <p:par>
-                    <p:cTn id="11" fill="hold">
-                      <p:stCondLst>
-                        <p:cond delay="indefinite"/>
-                      </p:stCondLst>
-                      <p:childTnLst>
-                        <p:par>
-                          <p:cTn id="12" fill="hold">
-                            <p:stCondLst>
-                              <p:cond delay="0"/>
-                            </p:stCondLst>
-                            <p:childTnLst>
-                              <p:par>
-                                <p:cTn id="13" presetID="10" presetClass="entr" presetSubtype="0" fill="hold" grpId="0" nodeType="clickEffect">
-                                  <p:stCondLst>
-                                    <p:cond delay="1500"/>
-                                  </p:stCondLst>
-                                  <p:iterate>
-                                    <p:tmPct val="10000"/>
-                                  </p:iterate>
-                                  <p:childTnLst>
-                                    <p:set>
-                                      <p:cBhvr>
-                                        <p:cTn id="14" dur="1" fill="hold">
-                                          <p:stCondLst>
-                                            <p:cond delay="0"/>
-                                          </p:stCondLst>
-                                        </p:cTn>
-                                        <p:tgtEl>
-                                          <p:spTgt spid="3">
-                                            <p:txEl>
-                                              <p:pRg st="2" end="2"/>
-                                            </p:txEl>
-                                          </p:spTgt>
-                                        </p:tgtEl>
-                                        <p:attrNameLst>
-                                          <p:attrName>style.visibility</p:attrName>
-                                        </p:attrNameLst>
-                                      </p:cBhvr>
-                                      <p:to>
-                                        <p:strVal val="visible"/>
-                                      </p:to>
-                                    </p:set>
-                                    <p:animEffect transition="in" filter="fade">
-                                      <p:cBhvr>
-                                        <p:cTn id="15" dur="700"/>
-                                        <p:tgtEl>
-                                          <p:spTgt spid="3">
-                                            <p:txEl>
-                                              <p:pRg st="2" end="2"/>
-                                            </p:txEl>
-                                          </p:spTgt>
-                                        </p:tgtEl>
-                                      </p:cBhvr>
-                                    </p:animEffect>
-                                  </p:childTnLst>
-                                </p:cTn>
-                              </p:par>
-                            </p:childTnLst>
-                          </p:cTn>
-                        </p:par>
-                      </p:childTnLst>
-                    </p:cTn>
-                  </p:par>
-                  <p:par>
-                    <p:cTn id="16" fill="hold">
-                      <p:stCondLst>
-                        <p:cond delay="indefinite"/>
-                      </p:stCondLst>
-                      <p:childTnLst>
-                        <p:par>
-                          <p:cTn id="17" fill="hold">
-                            <p:stCondLst>
-                              <p:cond delay="0"/>
-                            </p:stCondLst>
-                            <p:childTnLst>
-                              <p:par>
-                                <p:cTn id="18" presetID="10" presetClass="entr" presetSubtype="0" fill="hold" grpId="0" nodeType="clickEffect">
-                                  <p:stCondLst>
-                                    <p:cond delay="1500"/>
-                                  </p:stCondLst>
-                                  <p:iterate>
-                                    <p:tmPct val="10000"/>
-                                  </p:iterate>
-                                  <p:childTnLst>
-                                    <p:set>
-                                      <p:cBhvr>
-                                        <p:cTn id="19" dur="1" fill="hold">
-                                          <p:stCondLst>
-                                            <p:cond delay="0"/>
-                                          </p:stCondLst>
-                                        </p:cTn>
-                                        <p:tgtEl>
-                                          <p:spTgt spid="3">
-                                            <p:txEl>
-                                              <p:pRg st="3" end="3"/>
-                                            </p:txEl>
-                                          </p:spTgt>
-                                        </p:tgtEl>
-                                        <p:attrNameLst>
-                                          <p:attrName>style.visibility</p:attrName>
-                                        </p:attrNameLst>
-                                      </p:cBhvr>
-                                      <p:to>
-                                        <p:strVal val="visible"/>
-                                      </p:to>
-                                    </p:set>
-                                    <p:animEffect transition="in" filter="fade">
-                                      <p:cBhvr>
-                                        <p:cTn id="20" dur="700"/>
-                                        <p:tgtEl>
-                                          <p:spTgt spid="3">
-                                            <p:txEl>
-                                              <p:pRg st="3" end="3"/>
-                                            </p:txEl>
-                                          </p:spTgt>
-                                        </p:tgtEl>
-                                      </p:cBhvr>
-                                    </p:animEffect>
-                                  </p:childTnLst>
-                                </p:cTn>
-                              </p:par>
-                            </p:childTnLst>
-                          </p:cTn>
-                        </p:par>
-                      </p:childTnLst>
-                    </p:cTn>
-                  </p:par>
-                </p:childTnLst>
-              </p:cTn>
-              <p:prevCondLst>
-                <p:cond evt="onPrev" delay="0">
-                  <p:tgtEl>
-                    <p:sldTgt/>
-                  </p:tgtEl>
-                </p:cond>
-              </p:prevCondLst>
-              <p:nextCondLst>
-                <p:cond evt="onNext" delay="0">
-                  <p:tgtEl>
-                    <p:sldTgt/>
-                  </p:tgtEl>
-                </p:cond>
-              </p:nextCondLst>
-            </p:seq>
-          </p:childTnLst>
-        </p:cTn>
-      </p:par>
-    </p:tnLst>
-    <p:bldLst>
-      <p:bldP spid="2" grpId="0"/>
-      <p:bldP spid="3" grpId="0" build="p"/>
-    </p:bldLst>
-  </p:timing>
 </p:sld>
 </file>
 
@@ -7382,35 +7155,6 @@
           </a:p>
         </p:txBody>
       </p:sp>
-      <p:pic>
-        <p:nvPicPr>
-          <p:cNvPr id="4" name="Picture 3">
-            <a:extLst>
-              <a:ext uri="{FF2B5EF4-FFF2-40B4-BE49-F238E27FC236}">
-                <a16:creationId xmlns:a16="http://schemas.microsoft.com/office/drawing/2014/main" id="{A803A564-31F3-879E-E0F3-1805A3F45755}"/>
-              </a:ext>
-            </a:extLst>
-          </p:cNvPr>
-          <p:cNvPicPr>
-            <a:picLocks noChangeAspect="1"/>
-          </p:cNvPicPr>
-          <p:nvPr/>
-        </p:nvPicPr>
-        <p:blipFill>
-          <a:blip r:embed="rId3"/>
-          <a:srcRect l="17563"/>
-          <a:stretch/>
-        </p:blipFill>
-        <p:spPr>
-          <a:xfrm>
-            <a:off x="959205" y="364142"/>
-            <a:ext cx="10369645" cy="3867993"/>
-          </a:xfrm>
-          <a:prstGeom prst="rect">
-            <a:avLst/>
-          </a:prstGeom>
-        </p:spPr>
-      </p:pic>
       <p:sp>
         <p:nvSpPr>
           <p:cNvPr id="18" name="Rectangle 17">
@@ -7574,6 +7318,36 @@
           </a:p>
         </p:txBody>
       </p:sp>
+      <p:pic>
+        <p:nvPicPr>
+          <p:cNvPr id="13" name="Picture 12">
+            <a:extLst>
+              <a:ext uri="{FF2B5EF4-FFF2-40B4-BE49-F238E27FC236}">
+                <a16:creationId xmlns:a16="http://schemas.microsoft.com/office/drawing/2014/main" id="{104983D1-1B2A-8194-6CE7-8E22A2071D55}"/>
+              </a:ext>
+            </a:extLst>
+          </p:cNvPr>
+          <p:cNvPicPr>
+            <a:picLocks noChangeAspect="1"/>
+          </p:cNvPicPr>
+          <p:nvPr/>
+        </p:nvPicPr>
+        <p:blipFill>
+          <a:blip r:embed="rId3"/>
+          <a:stretch>
+            <a:fillRect/>
+          </a:stretch>
+        </p:blipFill>
+        <p:spPr>
+          <a:xfrm>
+            <a:off x="1737242" y="946861"/>
+            <a:ext cx="8793038" cy="2694462"/>
+          </a:xfrm>
+          <a:prstGeom prst="rect">
+            <a:avLst/>
+          </a:prstGeom>
+        </p:spPr>
+      </p:pic>
     </p:spTree>
     <p:extLst>
       <p:ext uri="{BB962C8B-B14F-4D97-AF65-F5344CB8AC3E}">
@@ -7588,373 +7362,6 @@
 </file>
 
 <file path=ppt/slides/slide6.xml><?xml version="1.0" encoding="utf-8"?>
-<p:sld xmlns:a="http://schemas.openxmlformats.org/drawingml/2006/main" xmlns:r="http://schemas.openxmlformats.org/officeDocument/2006/relationships" xmlns:p="http://schemas.openxmlformats.org/presentationml/2006/main">
-  <p:cSld>
-    <p:bg>
-      <p:bgPr>
-        <a:solidFill>
-          <a:schemeClr val="bg1"/>
-        </a:solidFill>
-        <a:effectLst/>
-      </p:bgPr>
-    </p:bg>
-    <p:spTree>
-      <p:nvGrpSpPr>
-        <p:cNvPr id="1" name=""/>
-        <p:cNvGrpSpPr/>
-        <p:nvPr/>
-      </p:nvGrpSpPr>
-      <p:grpSpPr>
-        <a:xfrm>
-          <a:off x="0" y="0"/>
-          <a:ext cx="0" cy="0"/>
-          <a:chOff x="0" y="0"/>
-          <a:chExt cx="0" cy="0"/>
-        </a:xfrm>
-      </p:grpSpPr>
-      <p:sp useBgFill="1">
-        <p:nvSpPr>
-          <p:cNvPr id="11" name="Rectangle 10">
-            <a:extLst>
-              <a:ext uri="{FF2B5EF4-FFF2-40B4-BE49-F238E27FC236}">
-                <a16:creationId xmlns:a16="http://schemas.microsoft.com/office/drawing/2014/main" id="{BA79A7CF-01AF-4178-9369-94E0C90EB046}"/>
-              </a:ext>
-              <a:ext uri="{C183D7F6-B498-43B3-948B-1728B52AA6E4}">
-                <adec:decorative xmlns:adec="http://schemas.microsoft.com/office/drawing/2017/decorative" val="1"/>
-              </a:ext>
-            </a:extLst>
-          </p:cNvPr>
-          <p:cNvSpPr>
-            <a:spLocks noGrp="1" noRot="1" noChangeAspect="1" noMove="1" noResize="1" noEditPoints="1" noAdjustHandles="1" noChangeArrowheads="1" noChangeShapeType="1" noTextEdit="1"/>
-          </p:cNvSpPr>
-          <p:nvPr>
-            <p:extLst>
-              <p:ext uri="{386F3935-93C4-4BCD-93E2-E3B085C9AB24}">
-                <p16:designElem xmlns:p16="http://schemas.microsoft.com/office/powerpoint/2015/main" val="1"/>
-              </p:ext>
-            </p:extLst>
-          </p:nvPr>
-        </p:nvSpPr>
-        <p:spPr>
-          <a:xfrm>
-            <a:off x="0" y="0"/>
-            <a:ext cx="12191999" cy="6857365"/>
-          </a:xfrm>
-          <a:prstGeom prst="rect">
-            <a:avLst/>
-          </a:prstGeom>
-          <a:ln>
-            <a:noFill/>
-          </a:ln>
-        </p:spPr>
-        <p:style>
-          <a:lnRef idx="2">
-            <a:schemeClr val="accent1">
-              <a:shade val="50000"/>
-            </a:schemeClr>
-          </a:lnRef>
-          <a:fillRef idx="1">
-            <a:schemeClr val="accent1"/>
-          </a:fillRef>
-          <a:effectRef idx="0">
-            <a:schemeClr val="accent1"/>
-          </a:effectRef>
-          <a:fontRef idx="minor">
-            <a:schemeClr val="lt1"/>
-          </a:fontRef>
-        </p:style>
-        <p:txBody>
-          <a:bodyPr rtlCol="0" anchor="ctr"/>
-          <a:lstStyle/>
-          <a:p>
-            <a:pPr algn="ctr"/>
-            <a:endParaRPr lang="en-US"/>
-          </a:p>
-        </p:txBody>
-      </p:sp>
-      <p:sp>
-        <p:nvSpPr>
-          <p:cNvPr id="2" name="Title 1">
-            <a:extLst>
-              <a:ext uri="{FF2B5EF4-FFF2-40B4-BE49-F238E27FC236}">
-                <a16:creationId xmlns:a16="http://schemas.microsoft.com/office/drawing/2014/main" id="{D4AF3757-C44A-8639-4D2D-5C536FB6D549}"/>
-              </a:ext>
-            </a:extLst>
-          </p:cNvPr>
-          <p:cNvSpPr>
-            <a:spLocks noGrp="1"/>
-          </p:cNvSpPr>
-          <p:nvPr>
-            <p:ph type="title"/>
-          </p:nvPr>
-        </p:nvSpPr>
-        <p:spPr>
-          <a:xfrm>
-            <a:off x="9267909" y="2023110"/>
-            <a:ext cx="2469624" cy="2846070"/>
-          </a:xfrm>
-        </p:spPr>
-        <p:txBody>
-          <a:bodyPr vert="horz" lIns="91440" tIns="45720" rIns="91440" bIns="45720" rtlCol="0" anchor="ctr">
-            <a:normAutofit/>
-          </a:bodyPr>
-          <a:lstStyle/>
-          <a:p>
-            <a:r>
-              <a:rPr lang="en-US" sz="3700" kern="1200" dirty="0">
-                <a:solidFill>
-                  <a:schemeClr val="tx1">
-                    <a:lumMod val="85000"/>
-                    <a:lumOff val="15000"/>
-                  </a:schemeClr>
-                </a:solidFill>
-                <a:latin typeface="Aptos Black" panose="020B0004020202020204" pitchFamily="34" charset="0"/>
-              </a:rPr>
-              <a:t>Churn Count by Internet Service Type</a:t>
-            </a:r>
-          </a:p>
-        </p:txBody>
-      </p:sp>
-      <p:sp>
-        <p:nvSpPr>
-          <p:cNvPr id="13" name="Rectangle 12">
-            <a:extLst>
-              <a:ext uri="{FF2B5EF4-FFF2-40B4-BE49-F238E27FC236}">
-                <a16:creationId xmlns:a16="http://schemas.microsoft.com/office/drawing/2014/main" id="{99413ED5-9ED4-4772-BCE4-2BCAE6B12E35}"/>
-              </a:ext>
-              <a:ext uri="{C183D7F6-B498-43B3-948B-1728B52AA6E4}">
-                <adec:decorative xmlns:adec="http://schemas.microsoft.com/office/drawing/2017/decorative" val="1"/>
-              </a:ext>
-            </a:extLst>
-          </p:cNvPr>
-          <p:cNvSpPr>
-            <a:spLocks noGrp="1" noRot="1" noChangeAspect="1" noMove="1" noResize="1" noEditPoints="1" noAdjustHandles="1" noChangeArrowheads="1" noChangeShapeType="1" noTextEdit="1"/>
-          </p:cNvSpPr>
-          <p:nvPr>
-            <p:extLst>
-              <p:ext uri="{386F3935-93C4-4BCD-93E2-E3B085C9AB24}">
-                <p16:designElem xmlns:p16="http://schemas.microsoft.com/office/powerpoint/2015/main" val="1"/>
-              </p:ext>
-            </p:extLst>
-          </p:nvPr>
-        </p:nvSpPr>
-        <p:spPr>
-          <a:xfrm rot="16200000">
-            <a:off x="3433973" y="-827233"/>
-            <a:ext cx="1715478" cy="8583421"/>
-          </a:xfrm>
-          <a:prstGeom prst="rect">
-            <a:avLst/>
-          </a:prstGeom>
-          <a:solidFill>
-            <a:schemeClr val="accent4"/>
-          </a:solidFill>
-          <a:ln>
-            <a:noFill/>
-          </a:ln>
-        </p:spPr>
-        <p:style>
-          <a:lnRef idx="2">
-            <a:schemeClr val="accent1">
-              <a:shade val="50000"/>
-            </a:schemeClr>
-          </a:lnRef>
-          <a:fillRef idx="1">
-            <a:schemeClr val="accent1"/>
-          </a:fillRef>
-          <a:effectRef idx="0">
-            <a:schemeClr val="accent1"/>
-          </a:effectRef>
-          <a:fontRef idx="minor">
-            <a:schemeClr val="lt1"/>
-          </a:fontRef>
-        </p:style>
-        <p:txBody>
-          <a:bodyPr rtlCol="0" anchor="ctr"/>
-          <a:lstStyle/>
-          <a:p>
-            <a:pPr algn="ctr"/>
-            <a:endParaRPr lang="en-US" dirty="0"/>
-          </a:p>
-        </p:txBody>
-      </p:sp>
-      <p:sp>
-        <p:nvSpPr>
-          <p:cNvPr id="15" name="Rectangle 14">
-            <a:extLst>
-              <a:ext uri="{FF2B5EF4-FFF2-40B4-BE49-F238E27FC236}">
-                <a16:creationId xmlns:a16="http://schemas.microsoft.com/office/drawing/2014/main" id="{04357C93-F0CB-4A1C-8F77-4E9063789819}"/>
-              </a:ext>
-              <a:ext uri="{C183D7F6-B498-43B3-948B-1728B52AA6E4}">
-                <adec:decorative xmlns:adec="http://schemas.microsoft.com/office/drawing/2017/decorative" val="1"/>
-              </a:ext>
-            </a:extLst>
-          </p:cNvPr>
-          <p:cNvSpPr>
-            <a:spLocks noGrp="1" noRot="1" noChangeAspect="1" noMove="1" noResize="1" noEditPoints="1" noAdjustHandles="1" noChangeArrowheads="1" noChangeShapeType="1" noTextEdit="1"/>
-          </p:cNvSpPr>
-          <p:nvPr>
-            <p:extLst>
-              <p:ext uri="{386F3935-93C4-4BCD-93E2-E3B085C9AB24}">
-                <p16:designElem xmlns:p16="http://schemas.microsoft.com/office/powerpoint/2015/main" val="1"/>
-              </p:ext>
-            </p:extLst>
-          </p:nvPr>
-        </p:nvSpPr>
-        <p:spPr>
-          <a:xfrm>
-            <a:off x="302085" y="664308"/>
-            <a:ext cx="8082632" cy="5600340"/>
-          </a:xfrm>
-          <a:prstGeom prst="rect">
-            <a:avLst/>
-          </a:prstGeom>
-          <a:solidFill>
-            <a:schemeClr val="bg1"/>
-          </a:solidFill>
-          <a:ln>
-            <a:noFill/>
-          </a:ln>
-          <a:effectLst>
-            <a:outerShdw blurRad="139700" dist="127000" dir="5400000" algn="t" rotWithShape="0">
-              <a:prstClr val="black">
-                <a:alpha val="15000"/>
-              </a:prstClr>
-            </a:outerShdw>
-          </a:effectLst>
-        </p:spPr>
-        <p:style>
-          <a:lnRef idx="2">
-            <a:schemeClr val="accent1">
-              <a:shade val="50000"/>
-            </a:schemeClr>
-          </a:lnRef>
-          <a:fillRef idx="1">
-            <a:schemeClr val="accent1"/>
-          </a:fillRef>
-          <a:effectRef idx="0">
-            <a:schemeClr val="accent1"/>
-          </a:effectRef>
-          <a:fontRef idx="minor">
-            <a:schemeClr val="lt1"/>
-          </a:fontRef>
-        </p:style>
-        <p:txBody>
-          <a:bodyPr rtlCol="0" anchor="ctr"/>
-          <a:lstStyle/>
-          <a:p>
-            <a:pPr algn="ctr"/>
-            <a:endParaRPr lang="en-US"/>
-          </a:p>
-        </p:txBody>
-      </p:sp>
-      <p:pic>
-        <p:nvPicPr>
-          <p:cNvPr id="6" name="Picture 5">
-            <a:extLst>
-              <a:ext uri="{FF2B5EF4-FFF2-40B4-BE49-F238E27FC236}">
-                <a16:creationId xmlns:a16="http://schemas.microsoft.com/office/drawing/2014/main" id="{5C192612-5D2D-A1A9-8751-186486028162}"/>
-              </a:ext>
-            </a:extLst>
-          </p:cNvPr>
-          <p:cNvPicPr>
-            <a:picLocks noChangeAspect="1"/>
-          </p:cNvPicPr>
-          <p:nvPr/>
-        </p:nvPicPr>
-        <p:blipFill>
-          <a:blip r:embed="rId2"/>
-          <a:stretch>
-            <a:fillRect/>
-          </a:stretch>
-        </p:blipFill>
-        <p:spPr>
-          <a:xfrm>
-            <a:off x="545238" y="1608969"/>
-            <a:ext cx="7608304" cy="3711017"/>
-          </a:xfrm>
-          <a:prstGeom prst="rect">
-            <a:avLst/>
-          </a:prstGeom>
-        </p:spPr>
-      </p:pic>
-      <p:sp>
-        <p:nvSpPr>
-          <p:cNvPr id="17" name="Rectangle 16">
-            <a:extLst>
-              <a:ext uri="{FF2B5EF4-FFF2-40B4-BE49-F238E27FC236}">
-                <a16:creationId xmlns:a16="http://schemas.microsoft.com/office/drawing/2014/main" id="{90F533E9-6690-41A8-A372-4C6C622D028D}"/>
-              </a:ext>
-              <a:ext uri="{C183D7F6-B498-43B3-948B-1728B52AA6E4}">
-                <adec:decorative xmlns:adec="http://schemas.microsoft.com/office/drawing/2017/decorative" val="1"/>
-              </a:ext>
-            </a:extLst>
-          </p:cNvPr>
-          <p:cNvSpPr>
-            <a:spLocks noGrp="1" noRot="1" noChangeAspect="1" noMove="1" noResize="1" noEditPoints="1" noAdjustHandles="1" noChangeArrowheads="1" noChangeShapeType="1" noTextEdit="1"/>
-          </p:cNvSpPr>
-          <p:nvPr>
-            <p:extLst>
-              <p:ext uri="{386F3935-93C4-4BCD-93E2-E3B085C9AB24}">
-                <p16:designElem xmlns:p16="http://schemas.microsoft.com/office/powerpoint/2015/main" val="1"/>
-              </p:ext>
-            </p:extLst>
-          </p:nvPr>
-        </p:nvSpPr>
-        <p:spPr>
-          <a:xfrm rot="5400000">
-            <a:off x="7950447" y="3392097"/>
-            <a:ext cx="1719072" cy="152382"/>
-          </a:xfrm>
-          <a:prstGeom prst="rect">
-            <a:avLst/>
-          </a:prstGeom>
-          <a:solidFill>
-            <a:schemeClr val="accent4"/>
-          </a:solidFill>
-          <a:ln>
-            <a:noFill/>
-          </a:ln>
-        </p:spPr>
-        <p:style>
-          <a:lnRef idx="2">
-            <a:schemeClr val="accent1">
-              <a:shade val="50000"/>
-            </a:schemeClr>
-          </a:lnRef>
-          <a:fillRef idx="1">
-            <a:schemeClr val="accent1"/>
-          </a:fillRef>
-          <a:effectRef idx="0">
-            <a:schemeClr val="accent1"/>
-          </a:effectRef>
-          <a:fontRef idx="minor">
-            <a:schemeClr val="lt1"/>
-          </a:fontRef>
-        </p:style>
-        <p:txBody>
-          <a:bodyPr rtlCol="0" anchor="ctr"/>
-          <a:lstStyle/>
-          <a:p>
-            <a:pPr algn="ctr"/>
-            <a:endParaRPr lang="en-US"/>
-          </a:p>
-        </p:txBody>
-      </p:sp>
-    </p:spTree>
-    <p:extLst>
-      <p:ext uri="{BB962C8B-B14F-4D97-AF65-F5344CB8AC3E}">
-        <p14:creationId xmlns:p14="http://schemas.microsoft.com/office/powerpoint/2010/main" val="3039969198"/>
-      </p:ext>
-    </p:extLst>
-  </p:cSld>
-  <p:clrMapOvr>
-    <a:masterClrMapping/>
-  </p:clrMapOvr>
-</p:sld>
-</file>
-
-<file path=ppt/slides/slide7.xml><?xml version="1.0" encoding="utf-8"?>
 <p:sld xmlns:a="http://schemas.openxmlformats.org/drawingml/2006/main" xmlns:r="http://schemas.openxmlformats.org/officeDocument/2006/relationships" xmlns:p="http://schemas.openxmlformats.org/presentationml/2006/main">
   <p:cSld>
     <p:bg>
@@ -8287,6 +7694,373 @@
     <p:extLst>
       <p:ext uri="{BB962C8B-B14F-4D97-AF65-F5344CB8AC3E}">
         <p14:creationId xmlns:p14="http://schemas.microsoft.com/office/powerpoint/2010/main" val="427276087"/>
+      </p:ext>
+    </p:extLst>
+  </p:cSld>
+  <p:clrMapOvr>
+    <a:masterClrMapping/>
+  </p:clrMapOvr>
+</p:sld>
+</file>
+
+<file path=ppt/slides/slide7.xml><?xml version="1.0" encoding="utf-8"?>
+<p:sld xmlns:a="http://schemas.openxmlformats.org/drawingml/2006/main" xmlns:r="http://schemas.openxmlformats.org/officeDocument/2006/relationships" xmlns:p="http://schemas.openxmlformats.org/presentationml/2006/main">
+  <p:cSld>
+    <p:bg>
+      <p:bgPr>
+        <a:solidFill>
+          <a:schemeClr val="bg1"/>
+        </a:solidFill>
+        <a:effectLst/>
+      </p:bgPr>
+    </p:bg>
+    <p:spTree>
+      <p:nvGrpSpPr>
+        <p:cNvPr id="1" name=""/>
+        <p:cNvGrpSpPr/>
+        <p:nvPr/>
+      </p:nvGrpSpPr>
+      <p:grpSpPr>
+        <a:xfrm>
+          <a:off x="0" y="0"/>
+          <a:ext cx="0" cy="0"/>
+          <a:chOff x="0" y="0"/>
+          <a:chExt cx="0" cy="0"/>
+        </a:xfrm>
+      </p:grpSpPr>
+      <p:sp useBgFill="1">
+        <p:nvSpPr>
+          <p:cNvPr id="11" name="Rectangle 10">
+            <a:extLst>
+              <a:ext uri="{FF2B5EF4-FFF2-40B4-BE49-F238E27FC236}">
+                <a16:creationId xmlns:a16="http://schemas.microsoft.com/office/drawing/2014/main" id="{BA79A7CF-01AF-4178-9369-94E0C90EB046}"/>
+              </a:ext>
+              <a:ext uri="{C183D7F6-B498-43B3-948B-1728B52AA6E4}">
+                <adec:decorative xmlns:adec="http://schemas.microsoft.com/office/drawing/2017/decorative" val="1"/>
+              </a:ext>
+            </a:extLst>
+          </p:cNvPr>
+          <p:cNvSpPr>
+            <a:spLocks noGrp="1" noRot="1" noChangeAspect="1" noMove="1" noResize="1" noEditPoints="1" noAdjustHandles="1" noChangeArrowheads="1" noChangeShapeType="1" noTextEdit="1"/>
+          </p:cNvSpPr>
+          <p:nvPr>
+            <p:extLst>
+              <p:ext uri="{386F3935-93C4-4BCD-93E2-E3B085C9AB24}">
+                <p16:designElem xmlns:p16="http://schemas.microsoft.com/office/powerpoint/2015/main" val="1"/>
+              </p:ext>
+            </p:extLst>
+          </p:nvPr>
+        </p:nvSpPr>
+        <p:spPr>
+          <a:xfrm>
+            <a:off x="0" y="0"/>
+            <a:ext cx="12191999" cy="6857365"/>
+          </a:xfrm>
+          <a:prstGeom prst="rect">
+            <a:avLst/>
+          </a:prstGeom>
+          <a:ln>
+            <a:noFill/>
+          </a:ln>
+        </p:spPr>
+        <p:style>
+          <a:lnRef idx="2">
+            <a:schemeClr val="accent1">
+              <a:shade val="50000"/>
+            </a:schemeClr>
+          </a:lnRef>
+          <a:fillRef idx="1">
+            <a:schemeClr val="accent1"/>
+          </a:fillRef>
+          <a:effectRef idx="0">
+            <a:schemeClr val="accent1"/>
+          </a:effectRef>
+          <a:fontRef idx="minor">
+            <a:schemeClr val="lt1"/>
+          </a:fontRef>
+        </p:style>
+        <p:txBody>
+          <a:bodyPr rtlCol="0" anchor="ctr"/>
+          <a:lstStyle/>
+          <a:p>
+            <a:pPr algn="ctr"/>
+            <a:endParaRPr lang="en-US"/>
+          </a:p>
+        </p:txBody>
+      </p:sp>
+      <p:sp>
+        <p:nvSpPr>
+          <p:cNvPr id="2" name="Title 1">
+            <a:extLst>
+              <a:ext uri="{FF2B5EF4-FFF2-40B4-BE49-F238E27FC236}">
+                <a16:creationId xmlns:a16="http://schemas.microsoft.com/office/drawing/2014/main" id="{D4AF3757-C44A-8639-4D2D-5C536FB6D549}"/>
+              </a:ext>
+            </a:extLst>
+          </p:cNvPr>
+          <p:cNvSpPr>
+            <a:spLocks noGrp="1"/>
+          </p:cNvSpPr>
+          <p:nvPr>
+            <p:ph type="title"/>
+          </p:nvPr>
+        </p:nvSpPr>
+        <p:spPr>
+          <a:xfrm>
+            <a:off x="9267909" y="2023110"/>
+            <a:ext cx="2469624" cy="2846070"/>
+          </a:xfrm>
+        </p:spPr>
+        <p:txBody>
+          <a:bodyPr vert="horz" lIns="91440" tIns="45720" rIns="91440" bIns="45720" rtlCol="0" anchor="ctr">
+            <a:normAutofit/>
+          </a:bodyPr>
+          <a:lstStyle/>
+          <a:p>
+            <a:r>
+              <a:rPr lang="en-US" sz="3700" kern="1200" dirty="0">
+                <a:solidFill>
+                  <a:schemeClr val="tx1">
+                    <a:lumMod val="85000"/>
+                    <a:lumOff val="15000"/>
+                  </a:schemeClr>
+                </a:solidFill>
+                <a:latin typeface="Aptos Black" panose="020B0004020202020204" pitchFamily="34" charset="0"/>
+              </a:rPr>
+              <a:t>Churn Count by Internet Service Type</a:t>
+            </a:r>
+          </a:p>
+        </p:txBody>
+      </p:sp>
+      <p:sp>
+        <p:nvSpPr>
+          <p:cNvPr id="13" name="Rectangle 12">
+            <a:extLst>
+              <a:ext uri="{FF2B5EF4-FFF2-40B4-BE49-F238E27FC236}">
+                <a16:creationId xmlns:a16="http://schemas.microsoft.com/office/drawing/2014/main" id="{99413ED5-9ED4-4772-BCE4-2BCAE6B12E35}"/>
+              </a:ext>
+              <a:ext uri="{C183D7F6-B498-43B3-948B-1728B52AA6E4}">
+                <adec:decorative xmlns:adec="http://schemas.microsoft.com/office/drawing/2017/decorative" val="1"/>
+              </a:ext>
+            </a:extLst>
+          </p:cNvPr>
+          <p:cNvSpPr>
+            <a:spLocks noGrp="1" noRot="1" noChangeAspect="1" noMove="1" noResize="1" noEditPoints="1" noAdjustHandles="1" noChangeArrowheads="1" noChangeShapeType="1" noTextEdit="1"/>
+          </p:cNvSpPr>
+          <p:nvPr>
+            <p:extLst>
+              <p:ext uri="{386F3935-93C4-4BCD-93E2-E3B085C9AB24}">
+                <p16:designElem xmlns:p16="http://schemas.microsoft.com/office/powerpoint/2015/main" val="1"/>
+              </p:ext>
+            </p:extLst>
+          </p:nvPr>
+        </p:nvSpPr>
+        <p:spPr>
+          <a:xfrm rot="16200000">
+            <a:off x="3433973" y="-827233"/>
+            <a:ext cx="1715478" cy="8583421"/>
+          </a:xfrm>
+          <a:prstGeom prst="rect">
+            <a:avLst/>
+          </a:prstGeom>
+          <a:solidFill>
+            <a:schemeClr val="accent4"/>
+          </a:solidFill>
+          <a:ln>
+            <a:noFill/>
+          </a:ln>
+        </p:spPr>
+        <p:style>
+          <a:lnRef idx="2">
+            <a:schemeClr val="accent1">
+              <a:shade val="50000"/>
+            </a:schemeClr>
+          </a:lnRef>
+          <a:fillRef idx="1">
+            <a:schemeClr val="accent1"/>
+          </a:fillRef>
+          <a:effectRef idx="0">
+            <a:schemeClr val="accent1"/>
+          </a:effectRef>
+          <a:fontRef idx="minor">
+            <a:schemeClr val="lt1"/>
+          </a:fontRef>
+        </p:style>
+        <p:txBody>
+          <a:bodyPr rtlCol="0" anchor="ctr"/>
+          <a:lstStyle/>
+          <a:p>
+            <a:pPr algn="ctr"/>
+            <a:endParaRPr lang="en-US" dirty="0"/>
+          </a:p>
+        </p:txBody>
+      </p:sp>
+      <p:sp>
+        <p:nvSpPr>
+          <p:cNvPr id="15" name="Rectangle 14">
+            <a:extLst>
+              <a:ext uri="{FF2B5EF4-FFF2-40B4-BE49-F238E27FC236}">
+                <a16:creationId xmlns:a16="http://schemas.microsoft.com/office/drawing/2014/main" id="{04357C93-F0CB-4A1C-8F77-4E9063789819}"/>
+              </a:ext>
+              <a:ext uri="{C183D7F6-B498-43B3-948B-1728B52AA6E4}">
+                <adec:decorative xmlns:adec="http://schemas.microsoft.com/office/drawing/2017/decorative" val="1"/>
+              </a:ext>
+            </a:extLst>
+          </p:cNvPr>
+          <p:cNvSpPr>
+            <a:spLocks noGrp="1" noRot="1" noChangeAspect="1" noMove="1" noResize="1" noEditPoints="1" noAdjustHandles="1" noChangeArrowheads="1" noChangeShapeType="1" noTextEdit="1"/>
+          </p:cNvSpPr>
+          <p:nvPr>
+            <p:extLst>
+              <p:ext uri="{386F3935-93C4-4BCD-93E2-E3B085C9AB24}">
+                <p16:designElem xmlns:p16="http://schemas.microsoft.com/office/powerpoint/2015/main" val="1"/>
+              </p:ext>
+            </p:extLst>
+          </p:nvPr>
+        </p:nvSpPr>
+        <p:spPr>
+          <a:xfrm>
+            <a:off x="302085" y="664308"/>
+            <a:ext cx="8082632" cy="5600340"/>
+          </a:xfrm>
+          <a:prstGeom prst="rect">
+            <a:avLst/>
+          </a:prstGeom>
+          <a:solidFill>
+            <a:schemeClr val="bg1"/>
+          </a:solidFill>
+          <a:ln>
+            <a:noFill/>
+          </a:ln>
+          <a:effectLst>
+            <a:outerShdw blurRad="139700" dist="127000" dir="5400000" algn="t" rotWithShape="0">
+              <a:prstClr val="black">
+                <a:alpha val="15000"/>
+              </a:prstClr>
+            </a:outerShdw>
+          </a:effectLst>
+        </p:spPr>
+        <p:style>
+          <a:lnRef idx="2">
+            <a:schemeClr val="accent1">
+              <a:shade val="50000"/>
+            </a:schemeClr>
+          </a:lnRef>
+          <a:fillRef idx="1">
+            <a:schemeClr val="accent1"/>
+          </a:fillRef>
+          <a:effectRef idx="0">
+            <a:schemeClr val="accent1"/>
+          </a:effectRef>
+          <a:fontRef idx="minor">
+            <a:schemeClr val="lt1"/>
+          </a:fontRef>
+        </p:style>
+        <p:txBody>
+          <a:bodyPr rtlCol="0" anchor="ctr"/>
+          <a:lstStyle/>
+          <a:p>
+            <a:pPr algn="ctr"/>
+            <a:endParaRPr lang="en-US"/>
+          </a:p>
+        </p:txBody>
+      </p:sp>
+      <p:pic>
+        <p:nvPicPr>
+          <p:cNvPr id="6" name="Picture 5">
+            <a:extLst>
+              <a:ext uri="{FF2B5EF4-FFF2-40B4-BE49-F238E27FC236}">
+                <a16:creationId xmlns:a16="http://schemas.microsoft.com/office/drawing/2014/main" id="{5C192612-5D2D-A1A9-8751-186486028162}"/>
+              </a:ext>
+            </a:extLst>
+          </p:cNvPr>
+          <p:cNvPicPr>
+            <a:picLocks noChangeAspect="1"/>
+          </p:cNvPicPr>
+          <p:nvPr/>
+        </p:nvPicPr>
+        <p:blipFill>
+          <a:blip r:embed="rId2"/>
+          <a:stretch>
+            <a:fillRect/>
+          </a:stretch>
+        </p:blipFill>
+        <p:spPr>
+          <a:xfrm>
+            <a:off x="545238" y="1608969"/>
+            <a:ext cx="7608304" cy="3711017"/>
+          </a:xfrm>
+          <a:prstGeom prst="rect">
+            <a:avLst/>
+          </a:prstGeom>
+        </p:spPr>
+      </p:pic>
+      <p:sp>
+        <p:nvSpPr>
+          <p:cNvPr id="17" name="Rectangle 16">
+            <a:extLst>
+              <a:ext uri="{FF2B5EF4-FFF2-40B4-BE49-F238E27FC236}">
+                <a16:creationId xmlns:a16="http://schemas.microsoft.com/office/drawing/2014/main" id="{90F533E9-6690-41A8-A372-4C6C622D028D}"/>
+              </a:ext>
+              <a:ext uri="{C183D7F6-B498-43B3-948B-1728B52AA6E4}">
+                <adec:decorative xmlns:adec="http://schemas.microsoft.com/office/drawing/2017/decorative" val="1"/>
+              </a:ext>
+            </a:extLst>
+          </p:cNvPr>
+          <p:cNvSpPr>
+            <a:spLocks noGrp="1" noRot="1" noChangeAspect="1" noMove="1" noResize="1" noEditPoints="1" noAdjustHandles="1" noChangeArrowheads="1" noChangeShapeType="1" noTextEdit="1"/>
+          </p:cNvSpPr>
+          <p:nvPr>
+            <p:extLst>
+              <p:ext uri="{386F3935-93C4-4BCD-93E2-E3B085C9AB24}">
+                <p16:designElem xmlns:p16="http://schemas.microsoft.com/office/powerpoint/2015/main" val="1"/>
+              </p:ext>
+            </p:extLst>
+          </p:nvPr>
+        </p:nvSpPr>
+        <p:spPr>
+          <a:xfrm rot="5400000">
+            <a:off x="7950447" y="3392097"/>
+            <a:ext cx="1719072" cy="152382"/>
+          </a:xfrm>
+          <a:prstGeom prst="rect">
+            <a:avLst/>
+          </a:prstGeom>
+          <a:solidFill>
+            <a:schemeClr val="accent4"/>
+          </a:solidFill>
+          <a:ln>
+            <a:noFill/>
+          </a:ln>
+        </p:spPr>
+        <p:style>
+          <a:lnRef idx="2">
+            <a:schemeClr val="accent1">
+              <a:shade val="50000"/>
+            </a:schemeClr>
+          </a:lnRef>
+          <a:fillRef idx="1">
+            <a:schemeClr val="accent1"/>
+          </a:fillRef>
+          <a:effectRef idx="0">
+            <a:schemeClr val="accent1"/>
+          </a:effectRef>
+          <a:fontRef idx="minor">
+            <a:schemeClr val="lt1"/>
+          </a:fontRef>
+        </p:style>
+        <p:txBody>
+          <a:bodyPr rtlCol="0" anchor="ctr"/>
+          <a:lstStyle/>
+          <a:p>
+            <a:pPr algn="ctr"/>
+            <a:endParaRPr lang="en-US"/>
+          </a:p>
+        </p:txBody>
+      </p:sp>
+    </p:spTree>
+    <p:extLst>
+      <p:ext uri="{BB962C8B-B14F-4D97-AF65-F5344CB8AC3E}">
+        <p14:creationId xmlns:p14="http://schemas.microsoft.com/office/powerpoint/2010/main" val="3039969198"/>
       </p:ext>
     </p:extLst>
   </p:cSld>

</xml_diff>